<commit_message>
small improvements in intro
</commit_message>
<xml_diff>
--- a/00_intro/usage.pptx
+++ b/00_intro/usage.pptx
@@ -212,7 +212,7 @@
           <a:p>
             <a:fld id="{B1546596-D83B-344F-A205-07C9F036CC5F}" type="datetimeFigureOut">
               <a:rPr lang="en-US" smtClean="0"/>
-              <a:t>1/20/17</a:t>
+              <a:t>3/19/19</a:t>
             </a:fld>
             <a:endParaRPr lang="en-US"/>
           </a:p>
@@ -911,15 +911,11 @@
           <a:p>
             <a:r>
               <a:rPr lang="ru-RU" dirty="0" smtClean="0"/>
-              <a:t>Многие библиотеки </a:t>
-            </a:r>
-            <a:r>
-              <a:rPr lang="ru-RU" dirty="0" err="1" smtClean="0"/>
-              <a:t>некачественые</a:t>
-            </a:r>
-            <a:r>
-              <a:rPr lang="ru-RU" dirty="0" smtClean="0"/>
-              <a:t>, слабо документированы, часто не имеют нормальной версионности.</a:t>
+              <a:t>плохая</a:t>
+            </a:r>
+            <a:r>
+              <a:rPr lang="ru-RU" baseline="0" dirty="0" smtClean="0"/>
+              <a:t> документация, плохая версионность</a:t>
             </a:r>
             <a:endParaRPr lang="en-US" dirty="0"/>
           </a:p>
@@ -1105,21 +1101,7 @@
           <a:p>
             <a:r>
               <a:rPr lang="ru-RU" dirty="0" smtClean="0"/>
-              <a:t>Например, тип </a:t>
-            </a:r>
-            <a:r>
-              <a:rPr lang="ru-RU" dirty="0" err="1" smtClean="0"/>
-              <a:t>map</a:t>
-            </a:r>
-            <a:r>
-              <a:rPr lang="ru-RU" dirty="0" smtClean="0"/>
-              <a:t> внедряли несколько лет.</a:t>
-            </a:r>
-          </a:p>
-          <a:p>
-            <a:r>
-              <a:rPr lang="ru-RU" dirty="0" smtClean="0"/>
-              <a:t>Развивается он не путем добавления новых </a:t>
+              <a:t>При этом он развивается довольно быстро. Но это больше касается виртуальной машины, чем </a:t>
             </a:r>
             <a:r>
               <a:rPr lang="ru-RU" dirty="0" err="1" smtClean="0"/>
@@ -1127,21 +1109,29 @@
             </a:r>
             <a:r>
               <a:rPr lang="ru-RU" dirty="0" smtClean="0"/>
-              <a:t>, а путем шлифовки того, что уже есть.</a:t>
-            </a:r>
-          </a:p>
-          <a:p>
+              <a:t> самого языка</a:t>
+            </a:r>
+            <a:r>
+              <a:rPr lang="ru-RU" smtClean="0"/>
+              <a:t>. </a:t>
+            </a:r>
+          </a:p>
+          <a:p>
+            <a:r>
+              <a:rPr lang="ru-RU" smtClean="0"/>
+              <a:t>То </a:t>
+            </a:r>
             <a:r>
               <a:rPr lang="ru-RU" dirty="0" smtClean="0"/>
-              <a:t>Лично мне это нравится. А кому не нравится,</a:t>
-            </a:r>
-            <a:r>
-              <a:rPr lang="ru-RU" baseline="0" dirty="0" smtClean="0"/>
-              <a:t> те выбирают </a:t>
-            </a:r>
-            <a:r>
-              <a:rPr lang="en-US" baseline="0" dirty="0" smtClean="0"/>
-              <a:t>Elixir.</a:t>
+              <a:t>есть, развивается он не путем добавления новых </a:t>
+            </a:r>
+            <a:r>
+              <a:rPr lang="ru-RU" dirty="0" err="1" smtClean="0"/>
+              <a:t>фич</a:t>
+            </a:r>
+            <a:r>
+              <a:rPr lang="ru-RU" dirty="0" smtClean="0"/>
+              <a:t>, а путем шлифовки того, что уже есть. Лично мне это нравится.</a:t>
             </a:r>
           </a:p>
           <a:p>
@@ -1608,51 +1598,73 @@
             </a:r>
             <a:r>
               <a:rPr lang="ru-RU" dirty="0" smtClean="0"/>
-              <a:t> за 19 млрд долл.</a:t>
-            </a:r>
-          </a:p>
-          <a:p>
+              <a:t> за 19 млрд долл</a:t>
+            </a:r>
             <a:r>
               <a:rPr lang="ru-RU" dirty="0" smtClean="0"/>
-              <a:t>На март 2015 при помощи </a:t>
-            </a:r>
-            <a:r>
-              <a:rPr lang="ru-RU" dirty="0" err="1" smtClean="0"/>
-              <a:t>WhatsApp</a:t>
-            </a:r>
-            <a:r>
-              <a:rPr lang="ru-RU" dirty="0" smtClean="0"/>
-              <a:t> пересылалось более 50 млрд сообщений в день.</a:t>
-            </a:r>
-          </a:p>
-          <a:p>
-            <a:r>
-              <a:rPr lang="ru-RU" dirty="0" smtClean="0"/>
-              <a:t>В начале февраля 2016 года в собственном блоге основатели </a:t>
-            </a:r>
-            <a:r>
-              <a:rPr lang="ru-RU" dirty="0" err="1" smtClean="0"/>
-              <a:t>WhatsApp</a:t>
-            </a:r>
-            <a:r>
-              <a:rPr lang="ru-RU" dirty="0" smtClean="0"/>
-              <a:t> заявили, что сервис преодолел планку в 1 миллиард пользователей.</a:t>
-            </a:r>
-          </a:p>
-          <a:p>
+              <a:t>.</a:t>
+            </a:r>
+            <a:endParaRPr lang="en-US" dirty="0" smtClean="0"/>
+          </a:p>
+          <a:p>
+            <a:endParaRPr lang="en-US" dirty="0" smtClean="0"/>
+          </a:p>
+          <a:p>
+            <a:r>
+              <a:rPr lang="en-US" dirty="0" err="1" smtClean="0"/>
+              <a:t>Некоторая</a:t>
+            </a:r>
             <a:r>
               <a:rPr lang="en-US" dirty="0" smtClean="0"/>
-              <a:t>https://</a:t>
+              <a:t> </a:t>
             </a:r>
             <a:r>
               <a:rPr lang="en-US" dirty="0" err="1" smtClean="0"/>
-              <a:t>habrahabr.ru</a:t>
+              <a:t>статистика</a:t>
             </a:r>
             <a:r>
               <a:rPr lang="en-US" dirty="0" smtClean="0"/>
-              <a:t>/post/276951/</a:t>
-            </a:r>
-            <a:endParaRPr lang="en-US" dirty="0"/>
+              <a:t> WhatsApp:</a:t>
+            </a:r>
+          </a:p>
+          <a:p>
+            <a:r>
+              <a:rPr lang="en-US" dirty="0" smtClean="0"/>
+              <a:t>2014/2018 </a:t>
+            </a:r>
+            <a:r>
+              <a:rPr lang="en-US" dirty="0" err="1" smtClean="0"/>
+              <a:t>год</a:t>
+            </a:r>
+            <a:r>
+              <a:rPr lang="en-US" dirty="0" smtClean="0"/>
+              <a:t>.</a:t>
+            </a:r>
+          </a:p>
+          <a:p>
+            <a:r>
+              <a:rPr lang="en-US" dirty="0" smtClean="0"/>
+              <a:t>monthly users:  465M -&gt; 1.5B  x3</a:t>
+            </a:r>
+          </a:p>
+          <a:p>
+            <a:r>
+              <a:rPr lang="en-US" dirty="0" smtClean="0"/>
+              <a:t>daily messages:  19B -&gt;  60B  x3</a:t>
+            </a:r>
+          </a:p>
+          <a:p>
+            <a:r>
+              <a:rPr lang="en-US" dirty="0" smtClean="0"/>
+              <a:t>daily pics:     600M -&gt; 4.5B  x7</a:t>
+            </a:r>
+          </a:p>
+          <a:p>
+            <a:r>
+              <a:rPr lang="en-US" dirty="0" smtClean="0"/>
+              <a:t>daily videos:   100M -&gt;   1B  x10</a:t>
+            </a:r>
+            <a:endParaRPr lang="ru-RU" dirty="0" smtClean="0"/>
           </a:p>
         </p:txBody>
       </p:sp>
@@ -2347,7 +2359,7 @@
           <a:p>
             <a:fld id="{9251B836-870B-234F-96F7-F054949925AD}" type="datetimeFigureOut">
               <a:rPr lang="en-US" smtClean="0"/>
-              <a:t>1/20/17</a:t>
+              <a:t>3/19/19</a:t>
             </a:fld>
             <a:endParaRPr lang="en-US"/>
           </a:p>
@@ -2517,7 +2529,7 @@
           <a:p>
             <a:fld id="{9251B836-870B-234F-96F7-F054949925AD}" type="datetimeFigureOut">
               <a:rPr lang="en-US" smtClean="0"/>
-              <a:t>1/20/17</a:t>
+              <a:t>3/19/19</a:t>
             </a:fld>
             <a:endParaRPr lang="en-US"/>
           </a:p>
@@ -2697,7 +2709,7 @@
           <a:p>
             <a:fld id="{9251B836-870B-234F-96F7-F054949925AD}" type="datetimeFigureOut">
               <a:rPr lang="en-US" smtClean="0"/>
-              <a:t>1/20/17</a:t>
+              <a:t>3/19/19</a:t>
             </a:fld>
             <a:endParaRPr lang="en-US"/>
           </a:p>
@@ -2867,7 +2879,7 @@
           <a:p>
             <a:fld id="{9251B836-870B-234F-96F7-F054949925AD}" type="datetimeFigureOut">
               <a:rPr lang="en-US" smtClean="0"/>
-              <a:t>1/20/17</a:t>
+              <a:t>3/19/19</a:t>
             </a:fld>
             <a:endParaRPr lang="en-US"/>
           </a:p>
@@ -3111,7 +3123,7 @@
           <a:p>
             <a:fld id="{9251B836-870B-234F-96F7-F054949925AD}" type="datetimeFigureOut">
               <a:rPr lang="en-US" smtClean="0"/>
-              <a:t>1/20/17</a:t>
+              <a:t>3/19/19</a:t>
             </a:fld>
             <a:endParaRPr lang="en-US"/>
           </a:p>
@@ -3343,7 +3355,7 @@
           <a:p>
             <a:fld id="{9251B836-870B-234F-96F7-F054949925AD}" type="datetimeFigureOut">
               <a:rPr lang="en-US" smtClean="0"/>
-              <a:t>1/20/17</a:t>
+              <a:t>3/19/19</a:t>
             </a:fld>
             <a:endParaRPr lang="en-US"/>
           </a:p>
@@ -3710,7 +3722,7 @@
           <a:p>
             <a:fld id="{9251B836-870B-234F-96F7-F054949925AD}" type="datetimeFigureOut">
               <a:rPr lang="en-US" smtClean="0"/>
-              <a:t>1/20/17</a:t>
+              <a:t>3/19/19</a:t>
             </a:fld>
             <a:endParaRPr lang="en-US"/>
           </a:p>
@@ -3828,7 +3840,7 @@
           <a:p>
             <a:fld id="{9251B836-870B-234F-96F7-F054949925AD}" type="datetimeFigureOut">
               <a:rPr lang="en-US" smtClean="0"/>
-              <a:t>1/20/17</a:t>
+              <a:t>3/19/19</a:t>
             </a:fld>
             <a:endParaRPr lang="en-US"/>
           </a:p>
@@ -3923,7 +3935,7 @@
           <a:p>
             <a:fld id="{9251B836-870B-234F-96F7-F054949925AD}" type="datetimeFigureOut">
               <a:rPr lang="en-US" smtClean="0"/>
-              <a:t>1/20/17</a:t>
+              <a:t>3/19/19</a:t>
             </a:fld>
             <a:endParaRPr lang="en-US"/>
           </a:p>
@@ -4200,7 +4212,7 @@
           <a:p>
             <a:fld id="{9251B836-870B-234F-96F7-F054949925AD}" type="datetimeFigureOut">
               <a:rPr lang="en-US" smtClean="0"/>
-              <a:t>1/20/17</a:t>
+              <a:t>3/19/19</a:t>
             </a:fld>
             <a:endParaRPr lang="en-US"/>
           </a:p>
@@ -4457,7 +4469,7 @@
           <a:p>
             <a:fld id="{9251B836-870B-234F-96F7-F054949925AD}" type="datetimeFigureOut">
               <a:rPr lang="en-US" smtClean="0"/>
-              <a:t>1/20/17</a:t>
+              <a:t>3/19/19</a:t>
             </a:fld>
             <a:endParaRPr lang="en-US"/>
           </a:p>
@@ -4670,7 +4682,7 @@
           <a:p>
             <a:fld id="{9251B836-870B-234F-96F7-F054949925AD}" type="datetimeFigureOut">
               <a:rPr lang="en-US" smtClean="0"/>
-              <a:t>1/20/17</a:t>
+              <a:t>3/19/19</a:t>
             </a:fld>
             <a:endParaRPr lang="en-US"/>
           </a:p>
@@ -5542,11 +5554,7 @@
             </a:r>
             <a:r>
               <a:rPr lang="ru-RU" sz="2400" dirty="0" smtClean="0"/>
-              <a:t>ало разработчиков – </a:t>
-            </a:r>
-            <a:r>
-              <a:rPr lang="ru-RU" sz="2400" dirty="0" smtClean="0"/>
-              <a:t>риск для компаний</a:t>
+              <a:t>ало разработчиков – риск для компаний</a:t>
             </a:r>
           </a:p>
           <a:p>
@@ -5668,8 +5676,12 @@
               <a:buNone/>
             </a:pPr>
             <a:r>
-              <a:rPr lang="ru-RU" sz="2400" dirty="0"/>
-              <a:t>Мало </a:t>
+              <a:rPr lang="ru-RU" sz="2400" dirty="0" smtClean="0"/>
+              <a:t>Не так много</a:t>
+            </a:r>
+            <a:r>
+              <a:rPr lang="ru-RU" sz="2400" dirty="0" smtClean="0"/>
+              <a:t> </a:t>
             </a:r>
             <a:r>
               <a:rPr lang="ru-RU" sz="2400" dirty="0" smtClean="0"/>
@@ -5688,15 +5700,7 @@
             </a:pPr>
             <a:r>
               <a:rPr lang="ru-RU" sz="2400" dirty="0" smtClean="0"/>
-              <a:t>еще </a:t>
-            </a:r>
-            <a:r>
-              <a:rPr lang="ru-RU" sz="2400" dirty="0"/>
-              <a:t>меньше качественных </a:t>
-            </a:r>
-            <a:r>
-              <a:rPr lang="ru-RU" sz="2400" dirty="0" smtClean="0"/>
-              <a:t>библиотек</a:t>
+              <a:t>многие библиотеки недостаточно зрелые и стабильные</a:t>
             </a:r>
             <a:endParaRPr lang="en-US" sz="2400" dirty="0"/>
           </a:p>
@@ -5922,8 +5926,12 @@
               <a:buNone/>
             </a:pPr>
             <a:r>
-              <a:rPr lang="ru-RU" sz="2400"/>
-              <a:t>Язык консервативный и развивается очень медленно</a:t>
+              <a:rPr lang="ru-RU" sz="2400" dirty="0"/>
+              <a:t>Язык консервативный и </a:t>
+            </a:r>
+            <a:r>
+              <a:rPr lang="ru-RU" sz="2400" dirty="0" smtClean="0"/>
+              <a:t>не модный</a:t>
             </a:r>
             <a:endParaRPr lang="en-US" sz="2400" dirty="0"/>
           </a:p>
@@ -6371,8 +6379,16 @@
               <a:buNone/>
             </a:pPr>
             <a:r>
+              <a:rPr lang="en-US" sz="2400" dirty="0"/>
+              <a:t>6</a:t>
+            </a:r>
+            <a:r>
+              <a:rPr lang="ru-RU" sz="2400" dirty="0" smtClean="0"/>
+              <a:t>0 </a:t>
+            </a:r>
+            <a:r>
               <a:rPr lang="ru-RU" sz="2400" dirty="0"/>
-              <a:t>50 млрд сообщений в </a:t>
+              <a:t>млрд сообщений в </a:t>
             </a:r>
             <a:r>
               <a:rPr lang="ru-RU" sz="2400" dirty="0" smtClean="0"/>
@@ -6390,8 +6406,28 @@
               <a:buNone/>
             </a:pPr>
             <a:r>
+              <a:rPr lang="ru-RU" sz="2400" dirty="0" smtClean="0"/>
+              <a:t>1</a:t>
+            </a:r>
+            <a:r>
+              <a:rPr lang="en-US" sz="2400" dirty="0" smtClean="0"/>
+              <a:t>.5</a:t>
+            </a:r>
+            <a:r>
+              <a:rPr lang="ru-RU" sz="2400" dirty="0" smtClean="0"/>
+              <a:t> миллиард</a:t>
+            </a:r>
+            <a:r>
               <a:rPr lang="ru-RU" sz="2400" dirty="0"/>
-              <a:t>1 миллиард пользователей</a:t>
+              <a:t>а</a:t>
+            </a:r>
+            <a:r>
+              <a:rPr lang="ru-RU" sz="2400" dirty="0" smtClean="0"/>
+              <a:t> </a:t>
+            </a:r>
+            <a:r>
+              <a:rPr lang="ru-RU" sz="2400" dirty="0"/>
+              <a:t>пользователей</a:t>
             </a:r>
             <a:endParaRPr lang="en-US" sz="2400" dirty="0"/>
           </a:p>

</xml_diff>